<commit_message>
kesz ppt es szoveg
</commit_message>
<xml_diff>
--- a/Zarovizsga/vedes.pptx
+++ b/Zarovizsga/vedes.pptx
@@ -12,7 +12,8 @@
     <p:sldId id="260" r:id="rId6"/>
     <p:sldId id="262" r:id="rId7"/>
     <p:sldId id="263" r:id="rId8"/>
-    <p:sldId id="264" r:id="rId9"/>
+    <p:sldId id="265" r:id="rId9"/>
+    <p:sldId id="264" r:id="rId10"/>
   </p:sldIdLst>
   <p:sldSz cx="12192000" cy="6858000"/>
   <p:notesSz cx="6858000" cy="9144000"/>
@@ -4402,7 +4403,7 @@
           <p:cNvPr id="2" name="Title 1">
             <a:extLst>
               <a:ext uri="{FF2B5EF4-FFF2-40B4-BE49-F238E27FC236}">
-                <a16:creationId xmlns:a16="http://schemas.microsoft.com/office/drawing/2014/main" id="{4BB0122B-6E58-4461-893F-A21C4A6B038B}"/>
+                <a16:creationId xmlns:a16="http://schemas.microsoft.com/office/drawing/2014/main" id="{BF17C338-2BB2-4A64-95E1-A2491259219D}"/>
               </a:ext>
             </a:extLst>
           </p:cNvPr>
@@ -4419,9 +4420,22 @@
           <a:lstStyle/>
           <a:p>
             <a:r>
-              <a:rPr lang="hu-HU" dirty="0"/>
-              <a:t>Osztályok részletesebb bemutatása</a:t>
-            </a:r>
+              <a:rPr lang="en-US" dirty="0" err="1"/>
+              <a:t>Osztályok</a:t>
+            </a:r>
+            <a:r>
+              <a:rPr lang="en-US" dirty="0"/>
+              <a:t> </a:t>
+            </a:r>
+            <a:r>
+              <a:rPr lang="en-US" dirty="0" err="1"/>
+              <a:t>bemutat</a:t>
+            </a:r>
+            <a:r>
+              <a:rPr lang="hu-HU" dirty="0" err="1"/>
+              <a:t>ása</a:t>
+            </a:r>
+            <a:endParaRPr lang="hu-HU" dirty="0"/>
           </a:p>
         </p:txBody>
       </p:sp>
@@ -4430,7 +4444,7 @@
           <p:cNvPr id="3" name="Content Placeholder 2">
             <a:extLst>
               <a:ext uri="{FF2B5EF4-FFF2-40B4-BE49-F238E27FC236}">
-                <a16:creationId xmlns:a16="http://schemas.microsoft.com/office/drawing/2014/main" id="{C0615FD8-73AD-4875-BD1F-43CBF3D7F7C7}"/>
+                <a16:creationId xmlns:a16="http://schemas.microsoft.com/office/drawing/2014/main" id="{DEB7259D-6545-43C2-A688-0B94111D9FDD}"/>
               </a:ext>
             </a:extLst>
           </p:cNvPr>
@@ -4446,10 +4460,196 @@
           <a:bodyPr/>
           <a:lstStyle/>
           <a:p>
-            <a:endParaRPr lang="hu-HU"/>
-          </a:p>
-        </p:txBody>
-      </p:sp>
+            <a:r>
+              <a:rPr lang="hu-HU" dirty="0"/>
+              <a:t>Új grafikus objektum</a:t>
+            </a:r>
+          </a:p>
+          <a:p>
+            <a:pPr lvl="1"/>
+            <a:r>
+              <a:rPr lang="hu-HU" dirty="0"/>
+              <a:t>Shader és Textúra a </a:t>
+            </a:r>
+            <a:r>
+              <a:rPr lang="hu-HU" dirty="0" err="1"/>
+              <a:t>RndererAPI</a:t>
+            </a:r>
+            <a:r>
+              <a:rPr lang="hu-HU" dirty="0"/>
+              <a:t> </a:t>
+            </a:r>
+            <a:r>
+              <a:rPr lang="hu-HU" dirty="0" err="1"/>
+              <a:t>wrapper</a:t>
+            </a:r>
+            <a:r>
+              <a:rPr lang="hu-HU" dirty="0"/>
+              <a:t> osztályaival</a:t>
+            </a:r>
+          </a:p>
+          <a:p>
+            <a:pPr lvl="1"/>
+            <a:r>
+              <a:rPr lang="hu-HU" dirty="0"/>
+              <a:t>A </a:t>
+            </a:r>
+            <a:r>
+              <a:rPr lang="hu-HU" dirty="0" err="1"/>
+              <a:t>TexturedRectanglehez</a:t>
+            </a:r>
+            <a:r>
+              <a:rPr lang="hu-HU" dirty="0"/>
+              <a:t> hasonlóan, </a:t>
+            </a:r>
+            <a:r>
+              <a:rPr lang="hu-HU" dirty="0" err="1"/>
+              <a:t>GameObject</a:t>
+            </a:r>
+            <a:r>
+              <a:rPr lang="hu-HU" dirty="0"/>
+              <a:t> </a:t>
+            </a:r>
+            <a:r>
+              <a:rPr lang="hu-HU" dirty="0" err="1"/>
+              <a:t>leszármazottaként</a:t>
+            </a:r>
+            <a:endParaRPr lang="hu-HU" dirty="0"/>
+          </a:p>
+          <a:p>
+            <a:pPr lvl="1"/>
+            <a:r>
+              <a:rPr lang="hu-HU" dirty="0" err="1"/>
+              <a:t>RendererAPI</a:t>
+            </a:r>
+            <a:r>
+              <a:rPr lang="hu-HU" dirty="0"/>
+              <a:t> + OpenGL (ami hiányzik az API-</a:t>
+            </a:r>
+            <a:r>
+              <a:rPr lang="hu-HU" dirty="0" err="1"/>
+              <a:t>ból</a:t>
+            </a:r>
+            <a:r>
+              <a:rPr lang="hu-HU" dirty="0"/>
+              <a:t>)</a:t>
+            </a:r>
+          </a:p>
+          <a:p>
+            <a:endParaRPr lang="hu-HU" dirty="0"/>
+          </a:p>
+          <a:p>
+            <a:r>
+              <a:rPr lang="hu-HU" dirty="0"/>
+              <a:t>Osztálydiagram</a:t>
+            </a:r>
+          </a:p>
+          <a:p>
+            <a:pPr lvl="1"/>
+            <a:r>
+              <a:rPr lang="hu-HU" dirty="0"/>
+              <a:t>Játék</a:t>
+            </a:r>
+          </a:p>
+          <a:p>
+            <a:pPr lvl="1"/>
+            <a:r>
+              <a:rPr lang="hu-HU" dirty="0"/>
+              <a:t>Labirintus</a:t>
+            </a:r>
+          </a:p>
+          <a:p>
+            <a:pPr lvl="1"/>
+            <a:r>
+              <a:rPr lang="hu-HU" dirty="0"/>
+              <a:t>Motor</a:t>
+            </a:r>
+          </a:p>
+          <a:p>
+            <a:pPr lvl="1"/>
+            <a:r>
+              <a:rPr lang="hu-HU" dirty="0"/>
+              <a:t>Platform függő kódok</a:t>
+            </a:r>
+          </a:p>
+        </p:txBody>
+      </p:sp>
+    </p:spTree>
+    <p:extLst>
+      <p:ext uri="{BB962C8B-B14F-4D97-AF65-F5344CB8AC3E}">
+        <p14:creationId xmlns:p14="http://schemas.microsoft.com/office/powerpoint/2010/main" val="4091498876"/>
+      </p:ext>
+    </p:extLst>
+  </p:cSld>
+  <p:clrMapOvr>
+    <a:masterClrMapping/>
+  </p:clrMapOvr>
+</p:sld>
+</file>
+
+<file path=ppt/slides/slide9.xml><?xml version="1.0" encoding="utf-8"?>
+<p:sld xmlns:a="http://schemas.openxmlformats.org/drawingml/2006/main" xmlns:r="http://schemas.openxmlformats.org/officeDocument/2006/relationships" xmlns:p="http://schemas.openxmlformats.org/presentationml/2006/main">
+  <p:cSld>
+    <p:bg>
+      <p:bgPr>
+        <a:solidFill>
+          <a:schemeClr val="bg1"/>
+        </a:solidFill>
+        <a:effectLst/>
+      </p:bgPr>
+    </p:bg>
+    <p:spTree>
+      <p:nvGrpSpPr>
+        <p:cNvPr id="1" name=""/>
+        <p:cNvGrpSpPr/>
+        <p:nvPr/>
+      </p:nvGrpSpPr>
+      <p:grpSpPr>
+        <a:xfrm>
+          <a:off x="0" y="0"/>
+          <a:ext cx="0" cy="0"/>
+          <a:chOff x="0" y="0"/>
+          <a:chExt cx="0" cy="0"/>
+        </a:xfrm>
+      </p:grpSpPr>
+      <p:pic>
+        <p:nvPicPr>
+          <p:cNvPr id="5" name="Content Placeholder 4" descr="Diagram, engineering drawing&#10;&#10;Description automatically generated">
+            <a:extLst>
+              <a:ext uri="{FF2B5EF4-FFF2-40B4-BE49-F238E27FC236}">
+                <a16:creationId xmlns:a16="http://schemas.microsoft.com/office/drawing/2014/main" id="{65290255-9074-45BC-9C82-173BCA65432E}"/>
+              </a:ext>
+            </a:extLst>
+          </p:cNvPr>
+          <p:cNvPicPr>
+            <a:picLocks noGrp="1" noChangeAspect="1"/>
+          </p:cNvPicPr>
+          <p:nvPr>
+            <p:ph idx="1"/>
+          </p:nvPr>
+        </p:nvPicPr>
+        <p:blipFill>
+          <a:blip r:embed="rId2">
+            <a:extLst>
+              <a:ext uri="{28A0092B-C50C-407E-A947-70E740481C1C}">
+                <a14:useLocalDpi xmlns:a14="http://schemas.microsoft.com/office/drawing/2010/main" val="0"/>
+              </a:ext>
+            </a:extLst>
+          </a:blip>
+          <a:stretch>
+            <a:fillRect/>
+          </a:stretch>
+        </p:blipFill>
+        <p:spPr>
+          <a:xfrm>
+            <a:off x="840277" y="643466"/>
+            <a:ext cx="10511446" cy="5571067"/>
+          </a:xfrm>
+          <a:prstGeom prst="rect">
+            <a:avLst/>
+          </a:prstGeom>
+        </p:spPr>
+      </p:pic>
     </p:spTree>
     <p:extLst>
       <p:ext uri="{BB962C8B-B14F-4D97-AF65-F5344CB8AC3E}">

</xml_diff>